<commit_message>
Présentation Programme avec la partie JG
</commit_message>
<xml_diff>
--- a/Com/COPIL.pptx
+++ b/Com/COPIL.pptx
@@ -9,8 +9,12 @@
     <p:sldId id="259" r:id="rId3"/>
     <p:sldId id="260" r:id="rId4"/>
     <p:sldId id="258" r:id="rId5"/>
-    <p:sldId id="261" r:id="rId6"/>
-    <p:sldId id="262" r:id="rId7"/>
+    <p:sldId id="265" r:id="rId6"/>
+    <p:sldId id="264" r:id="rId7"/>
+    <p:sldId id="266" r:id="rId8"/>
+    <p:sldId id="263" r:id="rId9"/>
+    <p:sldId id="261" r:id="rId10"/>
+    <p:sldId id="262" r:id="rId11"/>
   </p:sldIdLst>
   <p:sldSz cx="12192000" cy="6858000"/>
   <p:notesSz cx="6858000" cy="9144000"/>
@@ -248,7 +252,7 @@
           <a:p>
             <a:fld id="{D8F2A457-E6EE-4785-B69A-2F2F3857BDD1}" type="datetimeFigureOut">
               <a:rPr lang="fr-FR" smtClean="0"/>
-              <a:t>28/01/2015</a:t>
+              <a:t>23/02/2015</a:t>
             </a:fld>
             <a:endParaRPr lang="fr-FR"/>
           </a:p>
@@ -418,7 +422,7 @@
           <a:p>
             <a:fld id="{D8F2A457-E6EE-4785-B69A-2F2F3857BDD1}" type="datetimeFigureOut">
               <a:rPr lang="fr-FR" smtClean="0"/>
-              <a:t>28/01/2015</a:t>
+              <a:t>23/02/2015</a:t>
             </a:fld>
             <a:endParaRPr lang="fr-FR"/>
           </a:p>
@@ -598,7 +602,7 @@
           <a:p>
             <a:fld id="{D8F2A457-E6EE-4785-B69A-2F2F3857BDD1}" type="datetimeFigureOut">
               <a:rPr lang="fr-FR" smtClean="0"/>
-              <a:t>28/01/2015</a:t>
+              <a:t>23/02/2015</a:t>
             </a:fld>
             <a:endParaRPr lang="fr-FR"/>
           </a:p>
@@ -768,7 +772,7 @@
           <a:p>
             <a:fld id="{D8F2A457-E6EE-4785-B69A-2F2F3857BDD1}" type="datetimeFigureOut">
               <a:rPr lang="fr-FR" smtClean="0"/>
-              <a:t>28/01/2015</a:t>
+              <a:t>23/02/2015</a:t>
             </a:fld>
             <a:endParaRPr lang="fr-FR"/>
           </a:p>
@@ -1014,7 +1018,7 @@
           <a:p>
             <a:fld id="{D8F2A457-E6EE-4785-B69A-2F2F3857BDD1}" type="datetimeFigureOut">
               <a:rPr lang="fr-FR" smtClean="0"/>
-              <a:t>28/01/2015</a:t>
+              <a:t>23/02/2015</a:t>
             </a:fld>
             <a:endParaRPr lang="fr-FR"/>
           </a:p>
@@ -1246,7 +1250,7 @@
           <a:p>
             <a:fld id="{D8F2A457-E6EE-4785-B69A-2F2F3857BDD1}" type="datetimeFigureOut">
               <a:rPr lang="fr-FR" smtClean="0"/>
-              <a:t>28/01/2015</a:t>
+              <a:t>23/02/2015</a:t>
             </a:fld>
             <a:endParaRPr lang="fr-FR"/>
           </a:p>
@@ -1613,7 +1617,7 @@
           <a:p>
             <a:fld id="{D8F2A457-E6EE-4785-B69A-2F2F3857BDD1}" type="datetimeFigureOut">
               <a:rPr lang="fr-FR" smtClean="0"/>
-              <a:t>28/01/2015</a:t>
+              <a:t>23/02/2015</a:t>
             </a:fld>
             <a:endParaRPr lang="fr-FR"/>
           </a:p>
@@ -1731,7 +1735,7 @@
           <a:p>
             <a:fld id="{D8F2A457-E6EE-4785-B69A-2F2F3857BDD1}" type="datetimeFigureOut">
               <a:rPr lang="fr-FR" smtClean="0"/>
-              <a:t>28/01/2015</a:t>
+              <a:t>23/02/2015</a:t>
             </a:fld>
             <a:endParaRPr lang="fr-FR"/>
           </a:p>
@@ -1826,7 +1830,7 @@
           <a:p>
             <a:fld id="{D8F2A457-E6EE-4785-B69A-2F2F3857BDD1}" type="datetimeFigureOut">
               <a:rPr lang="fr-FR" smtClean="0"/>
-              <a:t>28/01/2015</a:t>
+              <a:t>23/02/2015</a:t>
             </a:fld>
             <a:endParaRPr lang="fr-FR"/>
           </a:p>
@@ -2103,7 +2107,7 @@
           <a:p>
             <a:fld id="{D8F2A457-E6EE-4785-B69A-2F2F3857BDD1}" type="datetimeFigureOut">
               <a:rPr lang="fr-FR" smtClean="0"/>
-              <a:t>28/01/2015</a:t>
+              <a:t>23/02/2015</a:t>
             </a:fld>
             <a:endParaRPr lang="fr-FR"/>
           </a:p>
@@ -2356,7 +2360,7 @@
           <a:p>
             <a:fld id="{D8F2A457-E6EE-4785-B69A-2F2F3857BDD1}" type="datetimeFigureOut">
               <a:rPr lang="fr-FR" smtClean="0"/>
-              <a:t>28/01/2015</a:t>
+              <a:t>23/02/2015</a:t>
             </a:fld>
             <a:endParaRPr lang="fr-FR"/>
           </a:p>
@@ -2424,7 +2428,7 @@
       <p:bgPr>
         <a:blipFill dpi="0" rotWithShape="1">
           <a:blip r:embed="rId13">
-            <a:alphaModFix amt="56000"/>
+            <a:alphaModFix amt="81000"/>
             <a:lum/>
           </a:blip>
           <a:srcRect/>
@@ -2579,7 +2583,7 @@
           <a:p>
             <a:fld id="{D8F2A457-E6EE-4785-B69A-2F2F3857BDD1}" type="datetimeFigureOut">
               <a:rPr lang="fr-FR" smtClean="0"/>
-              <a:t>28/01/2015</a:t>
+              <a:t>23/02/2015</a:t>
             </a:fld>
             <a:endParaRPr lang="fr-FR"/>
           </a:p>
@@ -3039,24 +3043,9 @@
 </p:sld>
 </file>
 
-<file path=ppt/slides/slide2.xml><?xml version="1.0" encoding="utf-8"?>
+<file path=ppt/slides/slide10.xml><?xml version="1.0" encoding="utf-8"?>
 <p:sld xmlns:a="http://schemas.openxmlformats.org/drawingml/2006/main" xmlns:r="http://schemas.openxmlformats.org/officeDocument/2006/relationships" xmlns:p="http://schemas.openxmlformats.org/presentationml/2006/main">
   <p:cSld>
-    <p:bg>
-      <p:bgPr>
-        <a:blipFill dpi="0" rotWithShape="1">
-          <a:blip r:embed="rId2">
-            <a:alphaModFix amt="56000"/>
-            <a:lum/>
-          </a:blip>
-          <a:srcRect/>
-          <a:stretch>
-            <a:fillRect l="-1000" r="-1000"/>
-          </a:stretch>
-        </a:blipFill>
-        <a:effectLst/>
-      </p:bgPr>
-    </p:bg>
     <p:spTree>
       <p:nvGrpSpPr>
         <p:cNvPr id="1" name=""/>
@@ -3088,6 +3077,133 @@
           <a:p>
             <a:r>
               <a:rPr lang="fr-FR" dirty="0" smtClean="0"/>
+              <a:t>Objectifs</a:t>
+            </a:r>
+            <a:endParaRPr lang="fr-FR" dirty="0"/>
+          </a:p>
+        </p:txBody>
+      </p:sp>
+      <p:sp>
+        <p:nvSpPr>
+          <p:cNvPr id="3" name="Content Placeholder 2"/>
+          <p:cNvSpPr>
+            <a:spLocks noGrp="1"/>
+          </p:cNvSpPr>
+          <p:nvPr>
+            <p:ph idx="1"/>
+          </p:nvPr>
+        </p:nvSpPr>
+        <p:spPr/>
+        <p:txBody>
+          <a:bodyPr/>
+          <a:lstStyle/>
+          <a:p>
+            <a:r>
+              <a:rPr lang="fr-FR" dirty="0" smtClean="0"/>
+              <a:t>Tracé de trajectoire sur ordinateur </a:t>
+            </a:r>
+            <a:r>
+              <a:rPr lang="fr-FR" dirty="0" smtClean="0"/>
+              <a:t>opérationnel</a:t>
+            </a:r>
+            <a:endParaRPr lang="fr-FR" dirty="0" smtClean="0"/>
+          </a:p>
+          <a:p>
+            <a:r>
+              <a:rPr lang="fr-FR" dirty="0" smtClean="0"/>
+              <a:t>Début de l’application mobile</a:t>
+            </a:r>
+          </a:p>
+          <a:p>
+            <a:r>
+              <a:rPr lang="fr-FR" dirty="0" smtClean="0"/>
+              <a:t>Modèle 3D du support smartphone</a:t>
+            </a:r>
+          </a:p>
+          <a:p>
+            <a:r>
+              <a:rPr lang="fr-FR" dirty="0" smtClean="0"/>
+              <a:t>Révision objectifs :</a:t>
+            </a:r>
+          </a:p>
+          <a:p>
+            <a:pPr lvl="1"/>
+            <a:r>
+              <a:rPr lang="fr-FR" dirty="0" smtClean="0"/>
+              <a:t>Abandon du </a:t>
+            </a:r>
+            <a:r>
+              <a:rPr lang="fr-FR" dirty="0" err="1" smtClean="0"/>
+              <a:t>Raspberry</a:t>
+            </a:r>
+            <a:r>
+              <a:rPr lang="fr-FR" dirty="0" smtClean="0"/>
+              <a:t> (du moins temporairement)</a:t>
+            </a:r>
+          </a:p>
+          <a:p>
+            <a:pPr lvl="1"/>
+            <a:r>
+              <a:rPr lang="fr-FR" dirty="0" smtClean="0"/>
+              <a:t>Gestion des effets mise de côté</a:t>
+            </a:r>
+          </a:p>
+          <a:p>
+            <a:pPr lvl="1"/>
+            <a:r>
+              <a:rPr lang="fr-FR" dirty="0" smtClean="0"/>
+              <a:t>Nouvel objectif : temps de réponse</a:t>
+            </a:r>
+          </a:p>
+        </p:txBody>
+      </p:sp>
+    </p:spTree>
+    <p:extLst>
+      <p:ext uri="{BB962C8B-B14F-4D97-AF65-F5344CB8AC3E}">
+        <p14:creationId xmlns:p14="http://schemas.microsoft.com/office/powerpoint/2010/main" val="659050785"/>
+      </p:ext>
+    </p:extLst>
+  </p:cSld>
+  <p:clrMapOvr>
+    <a:masterClrMapping/>
+  </p:clrMapOvr>
+</p:sld>
+</file>
+
+<file path=ppt/slides/slide2.xml><?xml version="1.0" encoding="utf-8"?>
+<p:sld xmlns:a="http://schemas.openxmlformats.org/drawingml/2006/main" xmlns:r="http://schemas.openxmlformats.org/officeDocument/2006/relationships" xmlns:p="http://schemas.openxmlformats.org/presentationml/2006/main">
+  <p:cSld>
+    <p:spTree>
+      <p:nvGrpSpPr>
+        <p:cNvPr id="1" name=""/>
+        <p:cNvGrpSpPr/>
+        <p:nvPr/>
+      </p:nvGrpSpPr>
+      <p:grpSpPr>
+        <a:xfrm>
+          <a:off x="0" y="0"/>
+          <a:ext cx="0" cy="0"/>
+          <a:chOff x="0" y="0"/>
+          <a:chExt cx="0" cy="0"/>
+        </a:xfrm>
+      </p:grpSpPr>
+      <p:sp>
+        <p:nvSpPr>
+          <p:cNvPr id="2" name="Title 1"/>
+          <p:cNvSpPr>
+            <a:spLocks noGrp="1"/>
+          </p:cNvSpPr>
+          <p:nvPr>
+            <p:ph type="title"/>
+          </p:nvPr>
+        </p:nvSpPr>
+        <p:spPr/>
+        <p:txBody>
+          <a:bodyPr/>
+          <a:lstStyle/>
+          <a:p>
+            <a:r>
+              <a:rPr lang="fr-FR" dirty="0" smtClean="0"/>
               <a:t>Introduction</a:t>
             </a:r>
             <a:endParaRPr lang="fr-FR" dirty="0"/>
@@ -3105,7 +3221,7 @@
           </p:nvPr>
         </p:nvPicPr>
         <p:blipFill>
-          <a:blip r:embed="rId3">
+          <a:blip r:embed="rId2">
             <a:extLst>
               <a:ext uri="{28A0092B-C50C-407E-A947-70E740481C1C}">
                 <a14:useLocalDpi xmlns:a14="http://schemas.microsoft.com/office/drawing/2010/main" val="0"/>
@@ -4252,6 +4368,393 @@
           <a:p>
             <a:r>
               <a:rPr lang="fr-FR" dirty="0" smtClean="0"/>
+              <a:t>Les bandes</a:t>
+            </a:r>
+            <a:endParaRPr lang="fr-FR" dirty="0"/>
+          </a:p>
+        </p:txBody>
+      </p:sp>
+      <p:sp>
+        <p:nvSpPr>
+          <p:cNvPr id="3" name="Content Placeholder 2"/>
+          <p:cNvSpPr>
+            <a:spLocks noGrp="1"/>
+          </p:cNvSpPr>
+          <p:nvPr>
+            <p:ph idx="1"/>
+          </p:nvPr>
+        </p:nvSpPr>
+        <p:spPr/>
+        <p:txBody>
+          <a:bodyPr/>
+          <a:lstStyle/>
+          <a:p>
+            <a:r>
+              <a:rPr lang="fr-FR" dirty="0" smtClean="0"/>
+              <a:t>12 points cliqués à la main stockés dans un tableau</a:t>
+            </a:r>
+            <a:endParaRPr lang="fr-FR" dirty="0"/>
+          </a:p>
+        </p:txBody>
+      </p:sp>
+      <p:pic>
+        <p:nvPicPr>
+          <p:cNvPr id="4" name="Picture 3"/>
+          <p:cNvPicPr>
+            <a:picLocks noChangeAspect="1"/>
+          </p:cNvPicPr>
+          <p:nvPr/>
+        </p:nvPicPr>
+        <p:blipFill>
+          <a:blip r:embed="rId2">
+            <a:extLst>
+              <a:ext uri="{28A0092B-C50C-407E-A947-70E740481C1C}">
+                <a14:useLocalDpi xmlns:a14="http://schemas.microsoft.com/office/drawing/2010/main" val="0"/>
+              </a:ext>
+            </a:extLst>
+          </a:blip>
+          <a:stretch>
+            <a:fillRect/>
+          </a:stretch>
+        </p:blipFill>
+        <p:spPr>
+          <a:xfrm>
+            <a:off x="3046294" y="2346738"/>
+            <a:ext cx="6099412" cy="3602189"/>
+          </a:xfrm>
+          <a:prstGeom prst="rect">
+            <a:avLst/>
+          </a:prstGeom>
+        </p:spPr>
+      </p:pic>
+    </p:spTree>
+    <p:extLst>
+      <p:ext uri="{BB962C8B-B14F-4D97-AF65-F5344CB8AC3E}">
+        <p14:creationId xmlns:p14="http://schemas.microsoft.com/office/powerpoint/2010/main" val="3735142593"/>
+      </p:ext>
+    </p:extLst>
+  </p:cSld>
+  <p:clrMapOvr>
+    <a:masterClrMapping/>
+  </p:clrMapOvr>
+</p:sld>
+</file>
+
+<file path=ppt/slides/slide6.xml><?xml version="1.0" encoding="utf-8"?>
+<p:sld xmlns:a="http://schemas.openxmlformats.org/drawingml/2006/main" xmlns:r="http://schemas.openxmlformats.org/officeDocument/2006/relationships" xmlns:p="http://schemas.openxmlformats.org/presentationml/2006/main">
+  <p:cSld>
+    <p:spTree>
+      <p:nvGrpSpPr>
+        <p:cNvPr id="1" name=""/>
+        <p:cNvGrpSpPr/>
+        <p:nvPr/>
+      </p:nvGrpSpPr>
+      <p:grpSpPr>
+        <a:xfrm>
+          <a:off x="0" y="0"/>
+          <a:ext cx="0" cy="0"/>
+          <a:chOff x="0" y="0"/>
+          <a:chExt cx="0" cy="0"/>
+        </a:xfrm>
+      </p:grpSpPr>
+      <p:sp>
+        <p:nvSpPr>
+          <p:cNvPr id="2" name="Title 1"/>
+          <p:cNvSpPr>
+            <a:spLocks noGrp="1"/>
+          </p:cNvSpPr>
+          <p:nvPr>
+            <p:ph type="title"/>
+          </p:nvPr>
+        </p:nvSpPr>
+        <p:spPr/>
+        <p:txBody>
+          <a:bodyPr/>
+          <a:lstStyle/>
+          <a:p>
+            <a:r>
+              <a:rPr lang="fr-FR" dirty="0" smtClean="0"/>
+              <a:t>Détection des billes</a:t>
+            </a:r>
+            <a:endParaRPr lang="fr-FR" dirty="0"/>
+          </a:p>
+        </p:txBody>
+      </p:sp>
+      <p:sp>
+        <p:nvSpPr>
+          <p:cNvPr id="3" name="Content Placeholder 2"/>
+          <p:cNvSpPr>
+            <a:spLocks noGrp="1"/>
+          </p:cNvSpPr>
+          <p:nvPr>
+            <p:ph idx="1"/>
+          </p:nvPr>
+        </p:nvSpPr>
+        <p:spPr/>
+        <p:txBody>
+          <a:bodyPr/>
+          <a:lstStyle/>
+          <a:p>
+            <a:r>
+              <a:rPr lang="fr-FR" dirty="0" err="1" smtClean="0"/>
+              <a:t>HoughCircles</a:t>
+            </a:r>
+            <a:r>
+              <a:rPr lang="fr-FR" dirty="0"/>
+              <a:t> </a:t>
+            </a:r>
+            <a:r>
+              <a:rPr lang="fr-FR" dirty="0" smtClean="0"/>
+              <a:t>-&gt; vecteur des cercles et de leurs rayons</a:t>
+            </a:r>
+          </a:p>
+          <a:p>
+            <a:pPr lvl="1"/>
+            <a:endParaRPr lang="fr-FR" dirty="0"/>
+          </a:p>
+        </p:txBody>
+      </p:sp>
+      <p:pic>
+        <p:nvPicPr>
+          <p:cNvPr id="7" name="Picture 6"/>
+          <p:cNvPicPr>
+            <a:picLocks noChangeAspect="1"/>
+          </p:cNvPicPr>
+          <p:nvPr/>
+        </p:nvPicPr>
+        <p:blipFill>
+          <a:blip r:embed="rId2">
+            <a:extLst>
+              <a:ext uri="{28A0092B-C50C-407E-A947-70E740481C1C}">
+                <a14:useLocalDpi xmlns:a14="http://schemas.microsoft.com/office/drawing/2010/main" val="0"/>
+              </a:ext>
+            </a:extLst>
+          </a:blip>
+          <a:stretch>
+            <a:fillRect/>
+          </a:stretch>
+        </p:blipFill>
+        <p:spPr>
+          <a:xfrm>
+            <a:off x="2429591" y="2406871"/>
+            <a:ext cx="7342206" cy="3332338"/>
+          </a:xfrm>
+          <a:prstGeom prst="rect">
+            <a:avLst/>
+          </a:prstGeom>
+        </p:spPr>
+      </p:pic>
+    </p:spTree>
+    <p:extLst>
+      <p:ext uri="{BB962C8B-B14F-4D97-AF65-F5344CB8AC3E}">
+        <p14:creationId xmlns:p14="http://schemas.microsoft.com/office/powerpoint/2010/main" val="143150235"/>
+      </p:ext>
+    </p:extLst>
+  </p:cSld>
+  <p:clrMapOvr>
+    <a:masterClrMapping/>
+  </p:clrMapOvr>
+</p:sld>
+</file>
+
+<file path=ppt/slides/slide7.xml><?xml version="1.0" encoding="utf-8"?>
+<p:sld xmlns:a="http://schemas.openxmlformats.org/drawingml/2006/main" xmlns:r="http://schemas.openxmlformats.org/officeDocument/2006/relationships" xmlns:p="http://schemas.openxmlformats.org/presentationml/2006/main">
+  <p:cSld>
+    <p:spTree>
+      <p:nvGrpSpPr>
+        <p:cNvPr id="1" name=""/>
+        <p:cNvGrpSpPr/>
+        <p:nvPr/>
+      </p:nvGrpSpPr>
+      <p:grpSpPr>
+        <a:xfrm>
+          <a:off x="0" y="0"/>
+          <a:ext cx="0" cy="0"/>
+          <a:chOff x="0" y="0"/>
+          <a:chExt cx="0" cy="0"/>
+        </a:xfrm>
+      </p:grpSpPr>
+      <p:sp>
+        <p:nvSpPr>
+          <p:cNvPr id="2" name="Title 1"/>
+          <p:cNvSpPr>
+            <a:spLocks noGrp="1"/>
+          </p:cNvSpPr>
+          <p:nvPr>
+            <p:ph type="title"/>
+          </p:nvPr>
+        </p:nvSpPr>
+        <p:spPr/>
+        <p:txBody>
+          <a:bodyPr/>
+          <a:lstStyle/>
+          <a:p>
+            <a:r>
+              <a:rPr lang="fr-FR" dirty="0" smtClean="0"/>
+              <a:t>Détection des couleurs</a:t>
+            </a:r>
+            <a:endParaRPr lang="fr-FR" dirty="0"/>
+          </a:p>
+        </p:txBody>
+      </p:sp>
+      <p:sp>
+        <p:nvSpPr>
+          <p:cNvPr id="3" name="Content Placeholder 2"/>
+          <p:cNvSpPr>
+            <a:spLocks noGrp="1"/>
+          </p:cNvSpPr>
+          <p:nvPr>
+            <p:ph idx="1"/>
+          </p:nvPr>
+        </p:nvSpPr>
+        <p:spPr/>
+        <p:txBody>
+          <a:bodyPr/>
+          <a:lstStyle/>
+          <a:p>
+            <a:r>
+              <a:rPr lang="fr-FR" dirty="0" smtClean="0"/>
+              <a:t>BGR -&gt; HSV</a:t>
+            </a:r>
+            <a:endParaRPr lang="fr-FR" dirty="0"/>
+          </a:p>
+        </p:txBody>
+      </p:sp>
+      <p:pic>
+        <p:nvPicPr>
+          <p:cNvPr id="4" name="Picture 3"/>
+          <p:cNvPicPr>
+            <a:picLocks noChangeAspect="1"/>
+          </p:cNvPicPr>
+          <p:nvPr/>
+        </p:nvPicPr>
+        <p:blipFill rotWithShape="1">
+          <a:blip r:embed="rId2">
+            <a:extLst>
+              <a:ext uri="{28A0092B-C50C-407E-A947-70E740481C1C}">
+                <a14:useLocalDpi xmlns:a14="http://schemas.microsoft.com/office/drawing/2010/main" val="0"/>
+              </a:ext>
+            </a:extLst>
+          </a:blip>
+          <a:srcRect b="19871"/>
+          <a:stretch/>
+        </p:blipFill>
+        <p:spPr>
+          <a:xfrm>
+            <a:off x="3066627" y="2184555"/>
+            <a:ext cx="6058746" cy="3633478"/>
+          </a:xfrm>
+          <a:prstGeom prst="rect">
+            <a:avLst/>
+          </a:prstGeom>
+        </p:spPr>
+      </p:pic>
+    </p:spTree>
+    <p:extLst>
+      <p:ext uri="{BB962C8B-B14F-4D97-AF65-F5344CB8AC3E}">
+        <p14:creationId xmlns:p14="http://schemas.microsoft.com/office/powerpoint/2010/main" val="103302304"/>
+      </p:ext>
+    </p:extLst>
+  </p:cSld>
+  <p:clrMapOvr>
+    <a:masterClrMapping/>
+  </p:clrMapOvr>
+</p:sld>
+</file>
+
+<file path=ppt/slides/slide8.xml><?xml version="1.0" encoding="utf-8"?>
+<p:sld xmlns:a="http://schemas.openxmlformats.org/drawingml/2006/main" xmlns:r="http://schemas.openxmlformats.org/officeDocument/2006/relationships" xmlns:p="http://schemas.openxmlformats.org/presentationml/2006/main">
+  <p:cSld>
+    <p:spTree>
+      <p:nvGrpSpPr>
+        <p:cNvPr id="1" name=""/>
+        <p:cNvGrpSpPr/>
+        <p:nvPr/>
+      </p:nvGrpSpPr>
+      <p:grpSpPr>
+        <a:xfrm>
+          <a:off x="0" y="0"/>
+          <a:ext cx="0" cy="0"/>
+          <a:chOff x="0" y="0"/>
+          <a:chExt cx="0" cy="0"/>
+        </a:xfrm>
+      </p:grpSpPr>
+      <p:pic>
+        <p:nvPicPr>
+          <p:cNvPr id="4" name="Content Placeholder 3"/>
+          <p:cNvPicPr>
+            <a:picLocks noGrp="1" noChangeAspect="1"/>
+          </p:cNvPicPr>
+          <p:nvPr>
+            <p:ph idx="1"/>
+          </p:nvPr>
+        </p:nvPicPr>
+        <p:blipFill>
+          <a:blip r:embed="rId2">
+            <a:extLst>
+              <a:ext uri="{28A0092B-C50C-407E-A947-70E740481C1C}">
+                <a14:useLocalDpi xmlns:a14="http://schemas.microsoft.com/office/drawing/2010/main" val="0"/>
+              </a:ext>
+            </a:extLst>
+          </a:blip>
+          <a:stretch>
+            <a:fillRect/>
+          </a:stretch>
+        </p:blipFill>
+        <p:spPr>
+          <a:xfrm>
+            <a:off x="1846154" y="842986"/>
+            <a:ext cx="8433429" cy="5202972"/>
+          </a:xfrm>
+        </p:spPr>
+      </p:pic>
+    </p:spTree>
+    <p:extLst>
+      <p:ext uri="{BB962C8B-B14F-4D97-AF65-F5344CB8AC3E}">
+        <p14:creationId xmlns:p14="http://schemas.microsoft.com/office/powerpoint/2010/main" val="486565556"/>
+      </p:ext>
+    </p:extLst>
+  </p:cSld>
+  <p:clrMapOvr>
+    <a:masterClrMapping/>
+  </p:clrMapOvr>
+</p:sld>
+</file>
+
+<file path=ppt/slides/slide9.xml><?xml version="1.0" encoding="utf-8"?>
+<p:sld xmlns:a="http://schemas.openxmlformats.org/drawingml/2006/main" xmlns:r="http://schemas.openxmlformats.org/officeDocument/2006/relationships" xmlns:p="http://schemas.openxmlformats.org/presentationml/2006/main">
+  <p:cSld>
+    <p:spTree>
+      <p:nvGrpSpPr>
+        <p:cNvPr id="1" name=""/>
+        <p:cNvGrpSpPr/>
+        <p:nvPr/>
+      </p:nvGrpSpPr>
+      <p:grpSpPr>
+        <a:xfrm>
+          <a:off x="0" y="0"/>
+          <a:ext cx="0" cy="0"/>
+          <a:chOff x="0" y="0"/>
+          <a:chExt cx="0" cy="0"/>
+        </a:xfrm>
+      </p:grpSpPr>
+      <p:sp>
+        <p:nvSpPr>
+          <p:cNvPr id="2" name="Title 1"/>
+          <p:cNvSpPr>
+            <a:spLocks noGrp="1"/>
+          </p:cNvSpPr>
+          <p:nvPr>
+            <p:ph type="title"/>
+          </p:nvPr>
+        </p:nvSpPr>
+        <p:spPr/>
+        <p:txBody>
+          <a:bodyPr/>
+          <a:lstStyle/>
+          <a:p>
+            <a:r>
+              <a:rPr lang="fr-FR" dirty="0" smtClean="0"/>
               <a:t>Bilan</a:t>
             </a:r>
             <a:endParaRPr lang="fr-FR" dirty="0"/>
@@ -4339,11 +4842,7 @@
                       </a:pPr>
                       <a:r>
                         <a:rPr lang="fr-FR" sz="3000" baseline="0" dirty="0" smtClean="0"/>
-                        <a:t>Créativité et </a:t>
-                      </a:r>
-                      <a:r>
-                        <a:rPr lang="fr-FR" sz="3000" baseline="0" dirty="0" smtClean="0"/>
-                        <a:t>idées</a:t>
+                        <a:t>Créativité et idées</a:t>
                       </a:r>
                     </a:p>
                     <a:p>
@@ -4389,13 +4888,8 @@
                       </a:r>
                       <a:r>
                         <a:rPr lang="fr-FR" sz="3000" baseline="0" dirty="0" smtClean="0"/>
-                        <a:t> </a:t>
+                        <a:t> fastidieuse + temps d’apprentissage sous-estimé</a:t>
                       </a:r>
-                      <a:r>
-                        <a:rPr lang="fr-FR" sz="3000" baseline="0" dirty="0" smtClean="0"/>
-                        <a:t>fastidieuse + temps d’apprentissage sous-estimé</a:t>
-                      </a:r>
-                      <a:endParaRPr lang="fr-FR" sz="3000" baseline="0" dirty="0" smtClean="0"/>
                     </a:p>
                     <a:p>
                       <a:pPr marL="457200" indent="-457200">
@@ -4404,11 +4898,7 @@
                       </a:pPr>
                       <a:r>
                         <a:rPr lang="fr-FR" sz="3000" baseline="0" dirty="0" smtClean="0"/>
-                        <a:t>Manque de </a:t>
-                      </a:r>
-                      <a:r>
-                        <a:rPr lang="fr-FR" sz="3000" baseline="0" dirty="0" smtClean="0"/>
-                        <a:t>temps (campagne BDE, vacances, partiels…)</a:t>
+                        <a:t>Manque de temps (campagne BDE, vacances, partiels…)</a:t>
                       </a:r>
                       <a:endParaRPr lang="fr-FR" sz="3000" baseline="0" dirty="0"/>
                     </a:p>
@@ -4424,136 +4914,6 @@
     <p:extLst>
       <p:ext uri="{BB962C8B-B14F-4D97-AF65-F5344CB8AC3E}">
         <p14:creationId xmlns:p14="http://schemas.microsoft.com/office/powerpoint/2010/main" val="3891543325"/>
-      </p:ext>
-    </p:extLst>
-  </p:cSld>
-  <p:clrMapOvr>
-    <a:masterClrMapping/>
-  </p:clrMapOvr>
-</p:sld>
-</file>
-
-<file path=ppt/slides/slide6.xml><?xml version="1.0" encoding="utf-8"?>
-<p:sld xmlns:a="http://schemas.openxmlformats.org/drawingml/2006/main" xmlns:r="http://schemas.openxmlformats.org/officeDocument/2006/relationships" xmlns:p="http://schemas.openxmlformats.org/presentationml/2006/main">
-  <p:cSld>
-    <p:spTree>
-      <p:nvGrpSpPr>
-        <p:cNvPr id="1" name=""/>
-        <p:cNvGrpSpPr/>
-        <p:nvPr/>
-      </p:nvGrpSpPr>
-      <p:grpSpPr>
-        <a:xfrm>
-          <a:off x="0" y="0"/>
-          <a:ext cx="0" cy="0"/>
-          <a:chOff x="0" y="0"/>
-          <a:chExt cx="0" cy="0"/>
-        </a:xfrm>
-      </p:grpSpPr>
-      <p:sp>
-        <p:nvSpPr>
-          <p:cNvPr id="2" name="Title 1"/>
-          <p:cNvSpPr>
-            <a:spLocks noGrp="1"/>
-          </p:cNvSpPr>
-          <p:nvPr>
-            <p:ph type="title"/>
-          </p:nvPr>
-        </p:nvSpPr>
-        <p:spPr/>
-        <p:txBody>
-          <a:bodyPr/>
-          <a:lstStyle/>
-          <a:p>
-            <a:r>
-              <a:rPr lang="fr-FR" dirty="0" smtClean="0"/>
-              <a:t>Objectifs</a:t>
-            </a:r>
-            <a:endParaRPr lang="fr-FR" dirty="0"/>
-          </a:p>
-        </p:txBody>
-      </p:sp>
-      <p:sp>
-        <p:nvSpPr>
-          <p:cNvPr id="3" name="Content Placeholder 2"/>
-          <p:cNvSpPr>
-            <a:spLocks noGrp="1"/>
-          </p:cNvSpPr>
-          <p:nvPr>
-            <p:ph idx="1"/>
-          </p:nvPr>
-        </p:nvSpPr>
-        <p:spPr/>
-        <p:txBody>
-          <a:bodyPr/>
-          <a:lstStyle/>
-          <a:p>
-            <a:r>
-              <a:rPr lang="fr-FR" dirty="0" smtClean="0"/>
-              <a:t>Tracé de trajectoire sur ordinateur opérationnel (soutenance fin février)</a:t>
-            </a:r>
-          </a:p>
-          <a:p>
-            <a:r>
-              <a:rPr lang="fr-FR" dirty="0" smtClean="0"/>
-              <a:t>Début de l’application </a:t>
-            </a:r>
-            <a:r>
-              <a:rPr lang="fr-FR" dirty="0" smtClean="0"/>
-              <a:t>mobile</a:t>
-            </a:r>
-          </a:p>
-          <a:p>
-            <a:r>
-              <a:rPr lang="fr-FR" dirty="0" smtClean="0"/>
-              <a:t>Modèle 3D du support smartphone</a:t>
-            </a:r>
-          </a:p>
-          <a:p>
-            <a:r>
-              <a:rPr lang="fr-FR" dirty="0" smtClean="0"/>
-              <a:t>Révision objectifs :</a:t>
-            </a:r>
-          </a:p>
-          <a:p>
-            <a:pPr lvl="1"/>
-            <a:r>
-              <a:rPr lang="fr-FR" dirty="0" smtClean="0"/>
-              <a:t>Abandon du </a:t>
-            </a:r>
-            <a:r>
-              <a:rPr lang="fr-FR" dirty="0" err="1" smtClean="0"/>
-              <a:t>Raspberry</a:t>
-            </a:r>
-            <a:r>
-              <a:rPr lang="fr-FR" dirty="0" smtClean="0"/>
-              <a:t> (du moins temporairement)</a:t>
-            </a:r>
-          </a:p>
-          <a:p>
-            <a:pPr lvl="1"/>
-            <a:r>
-              <a:rPr lang="fr-FR" dirty="0" smtClean="0"/>
-              <a:t>Gestion des effets mise de côté</a:t>
-            </a:r>
-          </a:p>
-          <a:p>
-            <a:pPr lvl="1"/>
-            <a:r>
-              <a:rPr lang="fr-FR" dirty="0" smtClean="0"/>
-              <a:t>Nouvel objectif : temps </a:t>
-            </a:r>
-            <a:r>
-              <a:rPr lang="fr-FR" smtClean="0"/>
-              <a:t>de réponse</a:t>
-            </a:r>
-          </a:p>
-        </p:txBody>
-      </p:sp>
-    </p:spTree>
-    <p:extLst>
-      <p:ext uri="{BB962C8B-B14F-4D97-AF65-F5344CB8AC3E}">
-        <p14:creationId xmlns:p14="http://schemas.microsoft.com/office/powerpoint/2010/main" val="659050785"/>
       </p:ext>
     </p:extLst>
   </p:cSld>

</xml_diff>